<commit_message>
updated standard dimension version
</commit_message>
<xml_diff>
--- a/presentations/FLAIRS-2018-cicirello-standard-dimensions.pptx
+++ b/presentations/FLAIRS-2018-cicirello-standard-dimensions.pptx
@@ -3930,15 +3930,7 @@
             <a:pPr lvl="1"/>
             <a:r>
               <a:rPr lang="en-US" sz="1600" dirty="0"/>
-              <a:t>Used </a:t>
-            </a:r>
-            <a:r>
-              <a:rPr lang="en-US" sz="1600" dirty="0"/>
-              <a:t>common benchmark set </a:t>
-            </a:r>
-            <a:r>
-              <a:rPr lang="en-US" sz="1600" dirty="0"/>
-              <a:t>(120 problem instances, with varying levels of </a:t>
+              <a:t>Used common benchmark set (120 problem instances, with varying levels of </a:t>
             </a:r>
             <a:r>
               <a:rPr lang="en-US" sz="1600" dirty="0" err="1"/>
@@ -3948,7 +3940,6 @@
               <a:rPr lang="en-US" sz="1600" dirty="0"/>
               <a:t> tightness, setup time severity)</a:t>
             </a:r>
-            <a:endParaRPr lang="en-US" sz="1600" dirty="0"/>
           </a:p>
           <a:p>
             <a:pPr lvl="1"/>
@@ -3961,11 +3952,7 @@
             <a:pPr lvl="1"/>
             <a:r>
               <a:rPr lang="en-US" sz="1600" dirty="0"/>
-              <a:t>Variety of algorithms applied to problem: neighborhood search (Liao et al, 2012), iterated local search (Xu et al 2014), ACO (Liao &amp; Juan 2007), among </a:t>
-            </a:r>
-            <a:r>
-              <a:rPr lang="en-US" sz="1600" dirty="0"/>
-              <a:t>others</a:t>
+              <a:t>Variety of algorithms applied to problem: neighborhood search (Liao et al, 2012), iterated local search (Xu et al 2014), ACO (Liao &amp; Juan 2007), among others</a:t>
             </a:r>
           </a:p>
           <a:p>
@@ -3986,7 +3973,6 @@
               <a:rPr lang="en-US" sz="1600" dirty="0"/>
               <a:t>Average over 10 runs on each of 98 problem instances (average of 980 runs).</a:t>
             </a:r>
-            <a:endParaRPr lang="en-US" sz="1600" dirty="0"/>
           </a:p>
           <a:p>
             <a:endParaRPr lang="en-US" sz="2000" dirty="0"/>
@@ -4064,10 +4050,6 @@
               </a:rPr>
               <a:t> Runtime</a:t>
             </a:r>
-            <a:endParaRPr lang="en-US" sz="3600" dirty="0">
-              <a:latin typeface="Arial" panose="020B0604020202020204" pitchFamily="34" charset="0"/>
-              <a:cs typeface="Arial" panose="020B0604020202020204" pitchFamily="34" charset="0"/>
-            </a:endParaRPr>
           </a:p>
         </p:txBody>
       </p:sp>
@@ -4083,7 +4065,7 @@
         </p:nvSpPr>
         <p:spPr>
           <a:xfrm>
-            <a:off x="426721" y="1390217"/>
+            <a:off x="426721" y="1021101"/>
             <a:ext cx="3770843" cy="447833"/>
           </a:xfrm>
         </p:spPr>
@@ -4092,13 +4074,13 @@
           <a:lstStyle/>
           <a:p>
             <a:r>
-              <a:rPr lang="en-US" sz="2000" dirty="0" smtClean="0">
+              <a:rPr lang="en-US" sz="2400" dirty="0" smtClean="0">
                 <a:latin typeface="Arial" panose="020B0604020202020204" pitchFamily="34" charset="0"/>
                 <a:cs typeface="Arial" panose="020B0604020202020204" pitchFamily="34" charset="0"/>
               </a:rPr>
               <a:t>Adaptive parameters</a:t>
             </a:r>
-            <a:endParaRPr lang="en-US" sz="2000" dirty="0">
+            <a:endParaRPr lang="en-US" sz="2400" dirty="0">
               <a:latin typeface="Arial" panose="020B0604020202020204" pitchFamily="34" charset="0"/>
               <a:cs typeface="Arial" panose="020B0604020202020204" pitchFamily="34" charset="0"/>
             </a:endParaRPr>
@@ -4129,7 +4111,7 @@
         </p:blipFill>
         <p:spPr>
           <a:xfrm>
-            <a:off x="426720" y="1828836"/>
+            <a:off x="426720" y="1459720"/>
             <a:ext cx="3771900" cy="2228850"/>
           </a:xfrm>
         </p:spPr>
@@ -4146,8 +4128,8 @@
         </p:nvSpPr>
         <p:spPr>
           <a:xfrm>
-            <a:off x="4335359" y="1523653"/>
-            <a:ext cx="3772323" cy="3711077"/>
+            <a:off x="4335359" y="1154537"/>
+            <a:ext cx="3772323" cy="4113749"/>
           </a:xfrm>
         </p:spPr>
         <p:txBody>
@@ -4155,7 +4137,7 @@
           <a:lstStyle/>
           <a:p>
             <a:r>
-              <a:rPr lang="en-US" sz="1600" dirty="0">
+              <a:rPr lang="en-US" dirty="0">
                 <a:latin typeface="Arial" panose="020B0604020202020204" pitchFamily="34" charset="0"/>
                 <a:cs typeface="Arial" panose="020B0604020202020204" pitchFamily="34" charset="0"/>
               </a:rPr>
@@ -4165,7 +4147,7 @@
           <a:p>
             <a:pPr lvl="1"/>
             <a:r>
-              <a:rPr lang="en-US" sz="1600" dirty="0" smtClean="0">
+              <a:rPr lang="en-US" sz="1800" dirty="0" smtClean="0">
                 <a:latin typeface="Arial" panose="020B0604020202020204" pitchFamily="34" charset="0"/>
                 <a:cs typeface="Arial" panose="020B0604020202020204" pitchFamily="34" charset="0"/>
               </a:rPr>
@@ -4175,7 +4157,7 @@
           <a:p>
             <a:pPr lvl="1"/>
             <a:r>
-              <a:rPr lang="en-US" sz="1600" dirty="0" smtClean="0">
+              <a:rPr lang="en-US" sz="1800" dirty="0" smtClean="0">
                 <a:latin typeface="Arial" panose="020B0604020202020204" pitchFamily="34" charset="0"/>
                 <a:cs typeface="Arial" panose="020B0604020202020204" pitchFamily="34" charset="0"/>
               </a:rPr>
@@ -4185,7 +4167,7 @@
           <a:p>
             <a:pPr lvl="1"/>
             <a:r>
-              <a:rPr lang="en-US" sz="1600" dirty="0" smtClean="0">
+              <a:rPr lang="en-US" sz="1800" dirty="0" smtClean="0">
                 <a:latin typeface="Arial" panose="020B0604020202020204" pitchFamily="34" charset="0"/>
                 <a:cs typeface="Arial" panose="020B0604020202020204" pitchFamily="34" charset="0"/>
               </a:rPr>
@@ -4194,35 +4176,28 @@
           </a:p>
           <a:p>
             <a:r>
-              <a:rPr lang="en-US" sz="1600" dirty="0" err="1">
+              <a:rPr lang="en-US" dirty="0" err="1">
                 <a:latin typeface="Arial" panose="020B0604020202020204" pitchFamily="34" charset="0"/>
                 <a:cs typeface="Arial" panose="020B0604020202020204" pitchFamily="34" charset="0"/>
               </a:rPr>
               <a:t>pGA</a:t>
             </a:r>
             <a:r>
-              <a:rPr lang="en-US" sz="1600" dirty="0">
+              <a:rPr lang="en-US" dirty="0">
                 <a:latin typeface="Arial" panose="020B0604020202020204" pitchFamily="34" charset="0"/>
                 <a:cs typeface="Arial" panose="020B0604020202020204" pitchFamily="34" charset="0"/>
               </a:rPr>
-              <a:t> </a:t>
-            </a:r>
-            <a:r>
-              <a:rPr lang="en-US" sz="1600" dirty="0">
-                <a:latin typeface="Arial" panose="020B0604020202020204" pitchFamily="34" charset="0"/>
-                <a:cs typeface="Arial" panose="020B0604020202020204" pitchFamily="34" charset="0"/>
-              </a:rPr>
-              <a:t>with adaptive parameters (4 threads) is 20% faster with </a:t>
-            </a:r>
-            <a:r>
-              <a:rPr lang="en-US" sz="1600" dirty="0" err="1">
+              <a:t> with adaptive parameters (4 threads) is 20% faster with </a:t>
+            </a:r>
+            <a:r>
+              <a:rPr lang="en-US" dirty="0" err="1">
                 <a:latin typeface="Arial" panose="020B0604020202020204" pitchFamily="34" charset="0"/>
                 <a:cs typeface="Arial" panose="020B0604020202020204" pitchFamily="34" charset="0"/>
               </a:rPr>
               <a:t>SplitMix</a:t>
             </a:r>
             <a:r>
-              <a:rPr lang="en-US" sz="1600" dirty="0">
+              <a:rPr lang="en-US" dirty="0">
                 <a:latin typeface="Arial" panose="020B0604020202020204" pitchFamily="34" charset="0"/>
                 <a:cs typeface="Arial" panose="020B0604020202020204" pitchFamily="34" charset="0"/>
               </a:rPr>
@@ -4231,51 +4206,26 @@
           </a:p>
           <a:p>
             <a:r>
-              <a:rPr lang="en-US" sz="1600" dirty="0">
+              <a:rPr lang="en-US" dirty="0">
                 <a:latin typeface="Arial" panose="020B0604020202020204" pitchFamily="34" charset="0"/>
                 <a:cs typeface="Arial" panose="020B0604020202020204" pitchFamily="34" charset="0"/>
               </a:rPr>
-              <a:t>Sequential GA with adaptive </a:t>
-            </a:r>
-            <a:r>
-              <a:rPr lang="en-US" sz="1600" dirty="0">
-                <a:latin typeface="Arial" panose="020B0604020202020204" pitchFamily="34" charset="0"/>
-                <a:cs typeface="Arial" panose="020B0604020202020204" pitchFamily="34" charset="0"/>
-              </a:rPr>
-              <a:t>parameters </a:t>
-            </a:r>
-            <a:r>
-              <a:rPr lang="en-US" sz="1600" dirty="0">
-                <a:latin typeface="Arial" panose="020B0604020202020204" pitchFamily="34" charset="0"/>
-                <a:cs typeface="Arial" panose="020B0604020202020204" pitchFamily="34" charset="0"/>
-              </a:rPr>
-              <a:t>is 25% faster with </a:t>
-            </a:r>
-            <a:r>
-              <a:rPr lang="en-US" sz="1600" dirty="0" err="1">
+              <a:t>Sequential GA with adaptive parameters is 25% faster with </a:t>
+            </a:r>
+            <a:r>
+              <a:rPr lang="en-US" dirty="0" err="1">
                 <a:latin typeface="Arial" panose="020B0604020202020204" pitchFamily="34" charset="0"/>
                 <a:cs typeface="Arial" panose="020B0604020202020204" pitchFamily="34" charset="0"/>
               </a:rPr>
               <a:t>SplitMix</a:t>
             </a:r>
             <a:r>
-              <a:rPr lang="en-US" sz="1600" dirty="0">
+              <a:rPr lang="en-US" dirty="0">
                 <a:latin typeface="Arial" panose="020B0604020202020204" pitchFamily="34" charset="0"/>
                 <a:cs typeface="Arial" panose="020B0604020202020204" pitchFamily="34" charset="0"/>
               </a:rPr>
-              <a:t> &amp; Ziggurat than with LC &amp; Polar</a:t>
-            </a:r>
-            <a:r>
-              <a:rPr lang="en-US" sz="1600" dirty="0">
-                <a:latin typeface="Arial" panose="020B0604020202020204" pitchFamily="34" charset="0"/>
-                <a:cs typeface="Arial" panose="020B0604020202020204" pitchFamily="34" charset="0"/>
-              </a:rPr>
-              <a:t>.</a:t>
-            </a:r>
-            <a:endParaRPr lang="en-US" sz="1600" dirty="0">
-              <a:latin typeface="Arial" panose="020B0604020202020204" pitchFamily="34" charset="0"/>
-              <a:cs typeface="Arial" panose="020B0604020202020204" pitchFamily="34" charset="0"/>
-            </a:endParaRPr>
+              <a:t> &amp; Ziggurat than with LC &amp; Polar.</a:t>
+            </a:r>
           </a:p>
         </p:txBody>
       </p:sp>
@@ -4287,8 +4237,8 @@
         </p:nvSpPr>
         <p:spPr>
           <a:xfrm>
-            <a:off x="108943" y="4094441"/>
-            <a:ext cx="4389654" cy="954107"/>
+            <a:off x="108943" y="3725325"/>
+            <a:ext cx="4389654" cy="1077218"/>
           </a:xfrm>
           <a:prstGeom prst="rect">
             <a:avLst/>
@@ -4302,16 +4252,15 @@
           <a:lstStyle/>
           <a:p>
             <a:r>
-              <a:rPr lang="en-US" sz="1400" dirty="0"/>
+              <a:rPr lang="en-US" sz="1600" dirty="0"/>
               <a:t>At any fixed number of threads, no statistical difference (Wilcoxon signed rank test)  on </a:t>
             </a:r>
           </a:p>
           <a:p>
             <a:r>
-              <a:rPr lang="en-US" sz="1400" dirty="0"/>
+              <a:rPr lang="en-US" sz="1600" dirty="0"/>
               <a:t>the scheduling optimization objective across the benchmark.</a:t>
             </a:r>
-            <a:endParaRPr lang="en-US" sz="1400" dirty="0"/>
           </a:p>
         </p:txBody>
       </p:sp>
@@ -4367,10 +4316,6 @@
               </a:rPr>
               <a:t>Scheduling performance</a:t>
             </a:r>
-            <a:endParaRPr lang="en-US" sz="3600" dirty="0">
-              <a:latin typeface="Arial" panose="020B0604020202020204" pitchFamily="34" charset="0"/>
-              <a:cs typeface="Arial" panose="020B0604020202020204" pitchFamily="34" charset="0"/>
-            </a:endParaRPr>
           </a:p>
         </p:txBody>
       </p:sp>
@@ -4398,7 +4343,7 @@
         </p:blipFill>
         <p:spPr>
           <a:xfrm>
-            <a:off x="426721" y="1617001"/>
+            <a:off x="426721" y="1080105"/>
             <a:ext cx="3769519" cy="2227442"/>
           </a:xfrm>
         </p:spPr>
@@ -4415,7 +4360,7 @@
         </p:nvSpPr>
         <p:spPr>
           <a:xfrm>
-            <a:off x="4338323" y="1617001"/>
+            <a:off x="4338323" y="1080105"/>
             <a:ext cx="3769360" cy="3802287"/>
           </a:xfrm>
         </p:spPr>
@@ -4423,61 +4368,54 @@
           <a:bodyPr/>
           <a:lstStyle/>
           <a:p>
+            <a:r>
+              <a:rPr lang="en-US" sz="1800" dirty="0">
+                <a:latin typeface="Arial" panose="020B0604020202020204" pitchFamily="34" charset="0"/>
+                <a:cs typeface="Arial" panose="020B0604020202020204" pitchFamily="34" charset="0"/>
+              </a:rPr>
+              <a:t>Sequential GA settings:</a:t>
+            </a:r>
+          </a:p>
+          <a:p>
+            <a:pPr lvl="1"/>
             <a:r>
               <a:rPr lang="en-US" sz="1600" dirty="0">
                 <a:latin typeface="Arial" panose="020B0604020202020204" pitchFamily="34" charset="0"/>
                 <a:cs typeface="Arial" panose="020B0604020202020204" pitchFamily="34" charset="0"/>
               </a:rPr>
-              <a:t>Sequential GA settings:</a:t>
-            </a:r>
-          </a:p>
-          <a:p>
-            <a:pPr lvl="1"/>
-            <a:r>
-              <a:rPr lang="en-US" sz="1400" dirty="0">
+              <a:t>Population size = 100 (as was originally the case)</a:t>
+            </a:r>
+          </a:p>
+          <a:p>
+            <a:r>
+              <a:rPr lang="en-US" sz="1800" dirty="0" err="1">
                 <a:latin typeface="Arial" panose="020B0604020202020204" pitchFamily="34" charset="0"/>
                 <a:cs typeface="Arial" panose="020B0604020202020204" pitchFamily="34" charset="0"/>
               </a:rPr>
-              <a:t>Population size = 100 (as was originally the case)</a:t>
-            </a:r>
-          </a:p>
-          <a:p>
-            <a:r>
-              <a:rPr lang="en-US" sz="1600" dirty="0" err="1">
+              <a:t>pGA</a:t>
+            </a:r>
+            <a:r>
+              <a:rPr lang="en-US" sz="1800" dirty="0">
                 <a:latin typeface="Arial" panose="020B0604020202020204" pitchFamily="34" charset="0"/>
                 <a:cs typeface="Arial" panose="020B0604020202020204" pitchFamily="34" charset="0"/>
               </a:rPr>
-              <a:t>p</a:t>
-            </a:r>
-            <a:r>
-              <a:rPr lang="en-US" sz="1600" dirty="0" err="1">
-                <a:latin typeface="Arial" panose="020B0604020202020204" pitchFamily="34" charset="0"/>
-                <a:cs typeface="Arial" panose="020B0604020202020204" pitchFamily="34" charset="0"/>
-              </a:rPr>
-              <a:t>GA</a:t>
-            </a:r>
+              <a:t> settings:</a:t>
+            </a:r>
+          </a:p>
+          <a:p>
+            <a:pPr lvl="1"/>
             <a:r>
               <a:rPr lang="en-US" sz="1600" dirty="0">
                 <a:latin typeface="Arial" panose="020B0604020202020204" pitchFamily="34" charset="0"/>
                 <a:cs typeface="Arial" panose="020B0604020202020204" pitchFamily="34" charset="0"/>
               </a:rPr>
-              <a:t> settings:</a:t>
+              <a:t>Subpopulation size = 100</a:t>
             </a:r>
           </a:p>
           <a:p>
             <a:pPr lvl="1"/>
             <a:r>
-              <a:rPr lang="en-US" sz="1400" dirty="0">
-                <a:latin typeface="Arial" panose="020B0604020202020204" pitchFamily="34" charset="0"/>
-                <a:cs typeface="Arial" panose="020B0604020202020204" pitchFamily="34" charset="0"/>
-              </a:rPr>
-              <a:t>Subpopulation size = 100</a:t>
-            </a:r>
-          </a:p>
-          <a:p>
-            <a:pPr lvl="1"/>
-            <a:r>
-              <a:rPr lang="en-US" sz="1400" dirty="0">
+              <a:rPr lang="en-US" sz="1600" dirty="0">
                 <a:latin typeface="Arial" panose="020B0604020202020204" pitchFamily="34" charset="0"/>
                 <a:cs typeface="Arial" panose="020B0604020202020204" pitchFamily="34" charset="0"/>
               </a:rPr>
@@ -4487,7 +4425,7 @@
           <a:p>
             <a:pPr lvl="1"/>
             <a:r>
-              <a:rPr lang="en-US" sz="1400" dirty="0">
+              <a:rPr lang="en-US" sz="1600" dirty="0">
                 <a:latin typeface="Arial" panose="020B0604020202020204" pitchFamily="34" charset="0"/>
                 <a:cs typeface="Arial" panose="020B0604020202020204" pitchFamily="34" charset="0"/>
               </a:rPr>
@@ -4496,7 +4434,7 @@
           </a:p>
           <a:p>
             <a:r>
-              <a:rPr lang="en-US" sz="1600" dirty="0">
+              <a:rPr lang="en-US" sz="1800" dirty="0">
                 <a:latin typeface="Arial" panose="020B0604020202020204" pitchFamily="34" charset="0"/>
                 <a:cs typeface="Arial" panose="020B0604020202020204" pitchFamily="34" charset="0"/>
               </a:rPr>
@@ -4505,30 +4443,26 @@
           </a:p>
           <a:p>
             <a:r>
-              <a:rPr lang="en-US" sz="1600" dirty="0">
+              <a:rPr lang="en-US" sz="1800" dirty="0">
                 <a:latin typeface="Arial" panose="020B0604020202020204" pitchFamily="34" charset="0"/>
                 <a:cs typeface="Arial" panose="020B0604020202020204" pitchFamily="34" charset="0"/>
               </a:rPr>
               <a:t>In 8.8s, the adaptive </a:t>
             </a:r>
             <a:r>
-              <a:rPr lang="en-US" sz="1600" dirty="0" err="1">
+              <a:rPr lang="en-US" sz="1800" dirty="0" err="1">
                 <a:latin typeface="Arial" panose="020B0604020202020204" pitchFamily="34" charset="0"/>
                 <a:cs typeface="Arial" panose="020B0604020202020204" pitchFamily="34" charset="0"/>
               </a:rPr>
               <a:t>pGA</a:t>
             </a:r>
             <a:r>
-              <a:rPr lang="en-US" sz="1600" dirty="0">
+              <a:rPr lang="en-US" sz="1800" dirty="0">
                 <a:latin typeface="Arial" panose="020B0604020202020204" pitchFamily="34" charset="0"/>
                 <a:cs typeface="Arial" panose="020B0604020202020204" pitchFamily="34" charset="0"/>
               </a:rPr>
               <a:t> achieves an average percent deviation equivalent to that of a 69s run of the sequential GA.</a:t>
             </a:r>
-            <a:endParaRPr lang="en-US" sz="1600" dirty="0">
-              <a:latin typeface="Arial" panose="020B0604020202020204" pitchFamily="34" charset="0"/>
-              <a:cs typeface="Arial" panose="020B0604020202020204" pitchFamily="34" charset="0"/>
-            </a:endParaRPr>
           </a:p>
         </p:txBody>
       </p:sp>
@@ -4596,10 +4530,6 @@
               </a:rPr>
               <a:t>: Adaptive vs Static Parameters</a:t>
             </a:r>
-            <a:endParaRPr lang="en-US" sz="3600" dirty="0">
-              <a:latin typeface="Arial" panose="020B0604020202020204" pitchFamily="34" charset="0"/>
-              <a:cs typeface="Arial" panose="020B0604020202020204" pitchFamily="34" charset="0"/>
-            </a:endParaRPr>
           </a:p>
         </p:txBody>
       </p:sp>
@@ -4613,14 +4543,14 @@
             <p:ph sz="half" idx="1"/>
             <p:extLst>
               <p:ext uri="{D42A27DB-BD31-4B8C-83A1-F6EECF244321}">
-                <p14:modId xmlns:p14="http://schemas.microsoft.com/office/powerpoint/2010/main" val="1456818996"/>
+                <p14:modId xmlns:p14="http://schemas.microsoft.com/office/powerpoint/2010/main" val="3777203224"/>
               </p:ext>
             </p:extLst>
           </p:nvPr>
         </p:nvGraphicFramePr>
         <p:xfrm>
-          <a:off x="426244" y="2007995"/>
-          <a:ext cx="3769519" cy="1668780"/>
+          <a:off x="402671" y="1504655"/>
+          <a:ext cx="4530055" cy="1691640"/>
         </p:xfrm>
         <a:graphic>
           <a:graphicData uri="http://schemas.openxmlformats.org/drawingml/2006/table">
@@ -4629,12 +4559,12 @@
                 <a:tableStyleId>{69CF1AB2-1976-4502-BF36-3FF5EA218861}</a:tableStyleId>
               </a:tblPr>
               <a:tblGrid>
-                <a:gridCol w="385391"/>
-                <a:gridCol w="780176"/>
-                <a:gridCol w="660633"/>
-                <a:gridCol w="528506"/>
-                <a:gridCol w="786560"/>
-                <a:gridCol w="628253"/>
+                <a:gridCol w="463148"/>
+                <a:gridCol w="895869"/>
+                <a:gridCol w="763399"/>
+                <a:gridCol w="645952"/>
+                <a:gridCol w="906011"/>
+                <a:gridCol w="855676"/>
               </a:tblGrid>
               <a:tr h="278130">
                 <a:tc>
@@ -4643,13 +4573,13 @@
                     <a:lstStyle/>
                     <a:p>
                       <a:r>
-                        <a:rPr lang="en-US" sz="1200" dirty="0" smtClean="0">
+                        <a:rPr lang="en-US" sz="1400" b="0" dirty="0" smtClean="0">
                           <a:latin typeface="Arial" panose="020B0604020202020204" pitchFamily="34" charset="0"/>
                           <a:cs typeface="Arial" panose="020B0604020202020204" pitchFamily="34" charset="0"/>
                         </a:rPr>
                         <a:t>G</a:t>
                       </a:r>
-                      <a:endParaRPr lang="en-US" sz="1200" dirty="0">
+                      <a:endParaRPr lang="en-US" sz="1400" b="0" dirty="0">
                         <a:latin typeface="Arial" panose="020B0604020202020204" pitchFamily="34" charset="0"/>
                         <a:cs typeface="Arial" panose="020B0604020202020204" pitchFamily="34" charset="0"/>
                       </a:endParaRPr>
@@ -4673,13 +4603,13 @@
                     <a:lstStyle/>
                     <a:p>
                       <a:r>
-                        <a:rPr lang="en-US" sz="1200" dirty="0" smtClean="0">
+                        <a:rPr lang="en-US" sz="1400" b="0" dirty="0" smtClean="0">
                           <a:latin typeface="Arial" panose="020B0604020202020204" pitchFamily="34" charset="0"/>
                           <a:cs typeface="Arial" panose="020B0604020202020204" pitchFamily="34" charset="0"/>
                         </a:rPr>
                         <a:t>Adaptive</a:t>
                       </a:r>
-                      <a:endParaRPr lang="en-US" sz="1200" dirty="0">
+                      <a:endParaRPr lang="en-US" sz="1400" b="0" dirty="0">
                         <a:latin typeface="Arial" panose="020B0604020202020204" pitchFamily="34" charset="0"/>
                         <a:cs typeface="Arial" panose="020B0604020202020204" pitchFamily="34" charset="0"/>
                       </a:endParaRPr>
@@ -4703,13 +4633,13 @@
                     <a:lstStyle/>
                     <a:p>
                       <a:r>
-                        <a:rPr lang="en-US" sz="1200" dirty="0" smtClean="0">
+                        <a:rPr lang="en-US" sz="1400" b="0" dirty="0" smtClean="0">
                           <a:latin typeface="Arial" panose="020B0604020202020204" pitchFamily="34" charset="0"/>
                           <a:cs typeface="Arial" panose="020B0604020202020204" pitchFamily="34" charset="0"/>
                         </a:rPr>
                         <a:t>Static</a:t>
                       </a:r>
-                      <a:endParaRPr lang="en-US" sz="1200" dirty="0">
+                      <a:endParaRPr lang="en-US" sz="1400" b="0" dirty="0">
                         <a:latin typeface="Arial" panose="020B0604020202020204" pitchFamily="34" charset="0"/>
                         <a:cs typeface="Arial" panose="020B0604020202020204" pitchFamily="34" charset="0"/>
                       </a:endParaRPr>
@@ -4723,13 +4653,13 @@
                     <a:lstStyle/>
                     <a:p>
                       <a:r>
-                        <a:rPr lang="en-US" sz="1200" dirty="0" smtClean="0">
+                        <a:rPr lang="en-US" sz="1400" b="0" dirty="0" smtClean="0">
                           <a:latin typeface="Arial" panose="020B0604020202020204" pitchFamily="34" charset="0"/>
                           <a:cs typeface="Arial" panose="020B0604020202020204" pitchFamily="34" charset="0"/>
                         </a:rPr>
                         <a:t>p</a:t>
                       </a:r>
-                      <a:endParaRPr lang="en-US" sz="1200" dirty="0">
+                      <a:endParaRPr lang="en-US" sz="1400" b="0" dirty="0">
                         <a:latin typeface="Arial" panose="020B0604020202020204" pitchFamily="34" charset="0"/>
                         <a:cs typeface="Arial" panose="020B0604020202020204" pitchFamily="34" charset="0"/>
                       </a:endParaRPr>
@@ -4753,13 +4683,13 @@
                     <a:lstStyle/>
                     <a:p>
                       <a:r>
-                        <a:rPr lang="en-US" sz="1200" dirty="0" smtClean="0">
+                        <a:rPr lang="en-US" sz="1400" b="0" dirty="0" smtClean="0">
                           <a:latin typeface="Arial" panose="020B0604020202020204" pitchFamily="34" charset="0"/>
                           <a:cs typeface="Arial" panose="020B0604020202020204" pitchFamily="34" charset="0"/>
                         </a:rPr>
                         <a:t>Adaptive</a:t>
                       </a:r>
-                      <a:endParaRPr lang="en-US" sz="1200" dirty="0">
+                      <a:endParaRPr lang="en-US" sz="1400" b="0" dirty="0">
                         <a:latin typeface="Arial" panose="020B0604020202020204" pitchFamily="34" charset="0"/>
                         <a:cs typeface="Arial" panose="020B0604020202020204" pitchFamily="34" charset="0"/>
                       </a:endParaRPr>
@@ -4783,13 +4713,13 @@
                     <a:lstStyle/>
                     <a:p>
                       <a:r>
-                        <a:rPr lang="en-US" sz="1200" dirty="0" smtClean="0">
+                        <a:rPr lang="en-US" sz="1400" b="0" dirty="0" smtClean="0">
                           <a:latin typeface="Arial" panose="020B0604020202020204" pitchFamily="34" charset="0"/>
                           <a:cs typeface="Arial" panose="020B0604020202020204" pitchFamily="34" charset="0"/>
                         </a:rPr>
                         <a:t>Static</a:t>
                       </a:r>
-                      <a:endParaRPr lang="en-US" sz="1200" dirty="0">
+                      <a:endParaRPr lang="en-US" sz="1400" b="0" dirty="0">
                         <a:latin typeface="Arial" panose="020B0604020202020204" pitchFamily="34" charset="0"/>
                         <a:cs typeface="Arial" panose="020B0604020202020204" pitchFamily="34" charset="0"/>
                       </a:endParaRPr>
@@ -4805,20 +4735,20 @@
                     <a:lstStyle/>
                     <a:p>
                       <a:r>
-                        <a:rPr lang="en-US" sz="1200" dirty="0" smtClean="0">
+                        <a:rPr lang="en-US" sz="1400" dirty="0" smtClean="0">
                           <a:latin typeface="Arial" panose="020B0604020202020204" pitchFamily="34" charset="0"/>
                           <a:cs typeface="Arial" panose="020B0604020202020204" pitchFamily="34" charset="0"/>
                         </a:rPr>
                         <a:t>10</a:t>
                       </a:r>
                       <a:r>
-                        <a:rPr lang="en-US" sz="1200" baseline="30000" dirty="0" smtClean="0">
+                        <a:rPr lang="en-US" sz="1400" baseline="30000" dirty="0" smtClean="0">
                           <a:latin typeface="Arial" panose="020B0604020202020204" pitchFamily="34" charset="0"/>
                           <a:cs typeface="Arial" panose="020B0604020202020204" pitchFamily="34" charset="0"/>
                         </a:rPr>
                         <a:t>2</a:t>
                       </a:r>
-                      <a:endParaRPr lang="en-US" sz="1200" baseline="30000" dirty="0">
+                      <a:endParaRPr lang="en-US" sz="1400" baseline="30000" dirty="0">
                         <a:latin typeface="Arial" panose="020B0604020202020204" pitchFamily="34" charset="0"/>
                         <a:cs typeface="Arial" panose="020B0604020202020204" pitchFamily="34" charset="0"/>
                       </a:endParaRPr>
@@ -4843,13 +4773,13 @@
                     <a:p>
                       <a:pPr algn="r"/>
                       <a:r>
-                        <a:rPr lang="en-US" sz="1200" dirty="0" smtClean="0">
+                        <a:rPr lang="en-US" sz="1400" dirty="0" smtClean="0">
                           <a:latin typeface="Arial" panose="020B0604020202020204" pitchFamily="34" charset="0"/>
                           <a:cs typeface="Arial" panose="020B0604020202020204" pitchFamily="34" charset="0"/>
                         </a:rPr>
                         <a:t>306.0%</a:t>
                       </a:r>
-                      <a:endParaRPr lang="en-US" sz="1200" dirty="0">
+                      <a:endParaRPr lang="en-US" sz="1400" dirty="0">
                         <a:latin typeface="Arial" panose="020B0604020202020204" pitchFamily="34" charset="0"/>
                         <a:cs typeface="Arial" panose="020B0604020202020204" pitchFamily="34" charset="0"/>
                       </a:endParaRPr>
@@ -4874,13 +4804,13 @@
                     <a:p>
                       <a:pPr algn="r"/>
                       <a:r>
-                        <a:rPr lang="en-US" sz="1200" dirty="0" smtClean="0">
+                        <a:rPr lang="en-US" sz="1400" dirty="0" smtClean="0">
                           <a:latin typeface="Arial" panose="020B0604020202020204" pitchFamily="34" charset="0"/>
                           <a:cs typeface="Arial" panose="020B0604020202020204" pitchFamily="34" charset="0"/>
                         </a:rPr>
                         <a:t>360.7%</a:t>
                       </a:r>
-                      <a:endParaRPr lang="en-US" sz="1200" dirty="0">
+                      <a:endParaRPr lang="en-US" sz="1400" dirty="0">
                         <a:latin typeface="Arial" panose="020B0604020202020204" pitchFamily="34" charset="0"/>
                         <a:cs typeface="Arial" panose="020B0604020202020204" pitchFamily="34" charset="0"/>
                       </a:endParaRPr>
@@ -4894,20 +4824,20 @@
                     <a:lstStyle/>
                     <a:p>
                       <a:r>
-                        <a:rPr lang="en-US" sz="1200" dirty="0" smtClean="0">
+                        <a:rPr lang="en-US" sz="1400" dirty="0" smtClean="0">
                           <a:latin typeface="Arial" panose="020B0604020202020204" pitchFamily="34" charset="0"/>
                           <a:cs typeface="Arial" panose="020B0604020202020204" pitchFamily="34" charset="0"/>
                         </a:rPr>
-                        <a:t>&lt; 10</a:t>
+                        <a:t>&lt;10</a:t>
                       </a:r>
                       <a:r>
-                        <a:rPr lang="en-US" sz="1200" baseline="30000" dirty="0" smtClean="0">
+                        <a:rPr lang="en-US" sz="1400" baseline="30000" dirty="0" smtClean="0">
                           <a:latin typeface="Arial" panose="020B0604020202020204" pitchFamily="34" charset="0"/>
                           <a:cs typeface="Arial" panose="020B0604020202020204" pitchFamily="34" charset="0"/>
                         </a:rPr>
                         <a:t>-8</a:t>
                       </a:r>
-                      <a:endParaRPr lang="en-US" sz="1200" baseline="30000" dirty="0">
+                      <a:endParaRPr lang="en-US" sz="1400" baseline="30000" dirty="0">
                         <a:latin typeface="Arial" panose="020B0604020202020204" pitchFamily="34" charset="0"/>
                         <a:cs typeface="Arial" panose="020B0604020202020204" pitchFamily="34" charset="0"/>
                       </a:endParaRPr>
@@ -4931,13 +4861,13 @@
                     <a:lstStyle/>
                     <a:p>
                       <a:r>
-                        <a:rPr lang="en-US" sz="1200" dirty="0" smtClean="0">
+                        <a:rPr lang="en-US" sz="1400" dirty="0" smtClean="0">
                           <a:latin typeface="Arial" panose="020B0604020202020204" pitchFamily="34" charset="0"/>
                           <a:cs typeface="Arial" panose="020B0604020202020204" pitchFamily="34" charset="0"/>
                         </a:rPr>
                         <a:t>0.3s</a:t>
                       </a:r>
-                      <a:endParaRPr lang="en-US" sz="1200" dirty="0">
+                      <a:endParaRPr lang="en-US" sz="1400" dirty="0">
                         <a:latin typeface="Arial" panose="020B0604020202020204" pitchFamily="34" charset="0"/>
                         <a:cs typeface="Arial" panose="020B0604020202020204" pitchFamily="34" charset="0"/>
                       </a:endParaRPr>
@@ -4961,13 +4891,13 @@
                     <a:lstStyle/>
                     <a:p>
                       <a:r>
-                        <a:rPr lang="en-US" sz="1200" dirty="0" smtClean="0">
+                        <a:rPr lang="en-US" sz="1400" dirty="0" smtClean="0">
                           <a:latin typeface="Arial" panose="020B0604020202020204" pitchFamily="34" charset="0"/>
                           <a:cs typeface="Arial" panose="020B0604020202020204" pitchFamily="34" charset="0"/>
                         </a:rPr>
                         <a:t>0.3s</a:t>
                       </a:r>
-                      <a:endParaRPr lang="en-US" sz="1200" dirty="0">
+                      <a:endParaRPr lang="en-US" sz="1400" dirty="0">
                         <a:latin typeface="Arial" panose="020B0604020202020204" pitchFamily="34" charset="0"/>
                         <a:cs typeface="Arial" panose="020B0604020202020204" pitchFamily="34" charset="0"/>
                       </a:endParaRPr>
@@ -5000,14 +4930,14 @@
                         <a:defRPr/>
                       </a:pPr>
                       <a:r>
-                        <a:rPr lang="en-US" sz="1200" dirty="0" smtClean="0">
+                        <a:rPr lang="en-US" sz="1400" dirty="0" smtClean="0">
                           <a:latin typeface="Arial" panose="020B0604020202020204" pitchFamily="34" charset="0"/>
                           <a:cs typeface="Arial" panose="020B0604020202020204" pitchFamily="34" charset="0"/>
                         </a:rPr>
                         <a:t>10</a:t>
                       </a:r>
                       <a:r>
-                        <a:rPr lang="en-US" sz="1200" baseline="30000" dirty="0" smtClean="0">
+                        <a:rPr lang="en-US" sz="1400" baseline="30000" dirty="0" smtClean="0">
                           <a:latin typeface="Arial" panose="020B0604020202020204" pitchFamily="34" charset="0"/>
                           <a:cs typeface="Arial" panose="020B0604020202020204" pitchFamily="34" charset="0"/>
                         </a:rPr>
@@ -5034,13 +4964,13 @@
                     <a:p>
                       <a:pPr algn="r"/>
                       <a:r>
-                        <a:rPr lang="en-US" sz="1200" dirty="0" smtClean="0">
+                        <a:rPr lang="en-US" sz="1400" dirty="0" smtClean="0">
                           <a:latin typeface="Arial" panose="020B0604020202020204" pitchFamily="34" charset="0"/>
                           <a:cs typeface="Arial" panose="020B0604020202020204" pitchFamily="34" charset="0"/>
                         </a:rPr>
                         <a:t>55.4%</a:t>
                       </a:r>
-                      <a:endParaRPr lang="en-US" sz="1200" dirty="0">
+                      <a:endParaRPr lang="en-US" sz="1400" dirty="0">
                         <a:latin typeface="Arial" panose="020B0604020202020204" pitchFamily="34" charset="0"/>
                         <a:cs typeface="Arial" panose="020B0604020202020204" pitchFamily="34" charset="0"/>
                       </a:endParaRPr>
@@ -5065,13 +4995,13 @@
                     <a:p>
                       <a:pPr algn="r"/>
                       <a:r>
-                        <a:rPr lang="en-US" sz="1200" dirty="0" smtClean="0">
+                        <a:rPr lang="en-US" sz="1400" dirty="0" smtClean="0">
                           <a:latin typeface="Arial" panose="020B0604020202020204" pitchFamily="34" charset="0"/>
                           <a:cs typeface="Arial" panose="020B0604020202020204" pitchFamily="34" charset="0"/>
                         </a:rPr>
                         <a:t>85.6%</a:t>
                       </a:r>
-                      <a:endParaRPr lang="en-US" sz="1200" dirty="0">
+                      <a:endParaRPr lang="en-US" sz="1400" dirty="0">
                         <a:latin typeface="Arial" panose="020B0604020202020204" pitchFamily="34" charset="0"/>
                         <a:cs typeface="Arial" panose="020B0604020202020204" pitchFamily="34" charset="0"/>
                       </a:endParaRPr>
@@ -5085,20 +5015,20 @@
                     <a:lstStyle/>
                     <a:p>
                       <a:r>
-                        <a:rPr lang="en-US" sz="1200" dirty="0" smtClean="0">
+                        <a:rPr lang="en-US" sz="1400" dirty="0" smtClean="0">
                           <a:latin typeface="Arial" panose="020B0604020202020204" pitchFamily="34" charset="0"/>
                           <a:cs typeface="Arial" panose="020B0604020202020204" pitchFamily="34" charset="0"/>
                         </a:rPr>
-                        <a:t>&lt; 10</a:t>
+                        <a:t>&lt;10</a:t>
                       </a:r>
                       <a:r>
-                        <a:rPr lang="en-US" sz="1200" baseline="30000" dirty="0" smtClean="0">
+                        <a:rPr lang="en-US" sz="1400" baseline="30000" dirty="0" smtClean="0">
                           <a:latin typeface="Arial" panose="020B0604020202020204" pitchFamily="34" charset="0"/>
                           <a:cs typeface="Arial" panose="020B0604020202020204" pitchFamily="34" charset="0"/>
                         </a:rPr>
                         <a:t>-8</a:t>
                       </a:r>
-                      <a:endParaRPr lang="en-US" sz="1200" baseline="30000" dirty="0">
+                      <a:endParaRPr lang="en-US" sz="1400" baseline="30000" dirty="0">
                         <a:latin typeface="Arial" panose="020B0604020202020204" pitchFamily="34" charset="0"/>
                         <a:cs typeface="Arial" panose="020B0604020202020204" pitchFamily="34" charset="0"/>
                       </a:endParaRPr>
@@ -5122,13 +5052,13 @@
                     <a:lstStyle/>
                     <a:p>
                       <a:r>
-                        <a:rPr lang="en-US" sz="1200" dirty="0" smtClean="0">
+                        <a:rPr lang="en-US" sz="1400" dirty="0" smtClean="0">
                           <a:latin typeface="Arial" panose="020B0604020202020204" pitchFamily="34" charset="0"/>
                           <a:cs typeface="Arial" panose="020B0604020202020204" pitchFamily="34" charset="0"/>
                         </a:rPr>
                         <a:t>0.6s</a:t>
                       </a:r>
-                      <a:endParaRPr lang="en-US" sz="1200" dirty="0">
+                      <a:endParaRPr lang="en-US" sz="1400" dirty="0">
                         <a:latin typeface="Arial" panose="020B0604020202020204" pitchFamily="34" charset="0"/>
                         <a:cs typeface="Arial" panose="020B0604020202020204" pitchFamily="34" charset="0"/>
                       </a:endParaRPr>
@@ -5152,13 +5082,13 @@
                     <a:lstStyle/>
                     <a:p>
                       <a:r>
-                        <a:rPr lang="en-US" sz="1200" dirty="0" smtClean="0">
+                        <a:rPr lang="en-US" sz="1400" dirty="0" smtClean="0">
                           <a:latin typeface="Arial" panose="020B0604020202020204" pitchFamily="34" charset="0"/>
                           <a:cs typeface="Arial" panose="020B0604020202020204" pitchFamily="34" charset="0"/>
                         </a:rPr>
                         <a:t>0.6s</a:t>
                       </a:r>
-                      <a:endParaRPr lang="en-US" sz="1200" dirty="0">
+                      <a:endParaRPr lang="en-US" sz="1400" dirty="0">
                         <a:latin typeface="Arial" panose="020B0604020202020204" pitchFamily="34" charset="0"/>
                         <a:cs typeface="Arial" panose="020B0604020202020204" pitchFamily="34" charset="0"/>
                       </a:endParaRPr>
@@ -5191,14 +5121,14 @@
                         <a:defRPr/>
                       </a:pPr>
                       <a:r>
-                        <a:rPr lang="en-US" sz="1200" dirty="0" smtClean="0">
+                        <a:rPr lang="en-US" sz="1400" dirty="0" smtClean="0">
                           <a:latin typeface="Arial" panose="020B0604020202020204" pitchFamily="34" charset="0"/>
                           <a:cs typeface="Arial" panose="020B0604020202020204" pitchFamily="34" charset="0"/>
                         </a:rPr>
                         <a:t>10</a:t>
                       </a:r>
                       <a:r>
-                        <a:rPr lang="en-US" sz="1200" baseline="30000" dirty="0" smtClean="0">
+                        <a:rPr lang="en-US" sz="1400" baseline="30000" dirty="0" smtClean="0">
                           <a:latin typeface="Arial" panose="020B0604020202020204" pitchFamily="34" charset="0"/>
                           <a:cs typeface="Arial" panose="020B0604020202020204" pitchFamily="34" charset="0"/>
                         </a:rPr>
@@ -5225,13 +5155,13 @@
                     <a:p>
                       <a:pPr algn="r"/>
                       <a:r>
-                        <a:rPr lang="en-US" sz="1200" dirty="0" smtClean="0">
+                        <a:rPr lang="en-US" sz="1400" dirty="0" smtClean="0">
                           <a:latin typeface="Arial" panose="020B0604020202020204" pitchFamily="34" charset="0"/>
                           <a:cs typeface="Arial" panose="020B0604020202020204" pitchFamily="34" charset="0"/>
                         </a:rPr>
                         <a:t>31.8%</a:t>
                       </a:r>
-                      <a:endParaRPr lang="en-US" sz="1200" dirty="0">
+                      <a:endParaRPr lang="en-US" sz="1400" dirty="0">
                         <a:latin typeface="Arial" panose="020B0604020202020204" pitchFamily="34" charset="0"/>
                         <a:cs typeface="Arial" panose="020B0604020202020204" pitchFamily="34" charset="0"/>
                       </a:endParaRPr>
@@ -5256,13 +5186,13 @@
                     <a:p>
                       <a:pPr algn="r"/>
                       <a:r>
-                        <a:rPr lang="en-US" sz="1200" dirty="0" smtClean="0">
+                        <a:rPr lang="en-US" sz="1400" dirty="0" smtClean="0">
                           <a:latin typeface="Arial" panose="020B0604020202020204" pitchFamily="34" charset="0"/>
                           <a:cs typeface="Arial" panose="020B0604020202020204" pitchFamily="34" charset="0"/>
                         </a:rPr>
                         <a:t>36.6%</a:t>
                       </a:r>
-                      <a:endParaRPr lang="en-US" sz="1200" dirty="0">
+                      <a:endParaRPr lang="en-US" sz="1400" dirty="0">
                         <a:latin typeface="Arial" panose="020B0604020202020204" pitchFamily="34" charset="0"/>
                         <a:cs typeface="Arial" panose="020B0604020202020204" pitchFamily="34" charset="0"/>
                       </a:endParaRPr>
@@ -5276,20 +5206,20 @@
                     <a:lstStyle/>
                     <a:p>
                       <a:r>
-                        <a:rPr lang="en-US" sz="1200" dirty="0" smtClean="0">
+                        <a:rPr lang="en-US" sz="1400" dirty="0" smtClean="0">
                           <a:latin typeface="Arial" panose="020B0604020202020204" pitchFamily="34" charset="0"/>
                           <a:cs typeface="Arial" panose="020B0604020202020204" pitchFamily="34" charset="0"/>
                         </a:rPr>
-                        <a:t>&lt; 10</a:t>
+                        <a:t>&lt;10</a:t>
                       </a:r>
                       <a:r>
-                        <a:rPr lang="en-US" sz="1200" baseline="30000" dirty="0" smtClean="0">
+                        <a:rPr lang="en-US" sz="1400" baseline="30000" dirty="0" smtClean="0">
                           <a:latin typeface="Arial" panose="020B0604020202020204" pitchFamily="34" charset="0"/>
                           <a:cs typeface="Arial" panose="020B0604020202020204" pitchFamily="34" charset="0"/>
                         </a:rPr>
                         <a:t>-8</a:t>
                       </a:r>
-                      <a:endParaRPr lang="en-US" sz="1200" baseline="30000" dirty="0">
+                      <a:endParaRPr lang="en-US" sz="1400" baseline="30000" dirty="0">
                         <a:latin typeface="Arial" panose="020B0604020202020204" pitchFamily="34" charset="0"/>
                         <a:cs typeface="Arial" panose="020B0604020202020204" pitchFamily="34" charset="0"/>
                       </a:endParaRPr>
@@ -5313,13 +5243,13 @@
                     <a:lstStyle/>
                     <a:p>
                       <a:r>
-                        <a:rPr lang="en-US" sz="1200" dirty="0" smtClean="0">
+                        <a:rPr lang="en-US" sz="1400" dirty="0" smtClean="0">
                           <a:latin typeface="Arial" panose="020B0604020202020204" pitchFamily="34" charset="0"/>
                           <a:cs typeface="Arial" panose="020B0604020202020204" pitchFamily="34" charset="0"/>
                         </a:rPr>
                         <a:t>1.6s</a:t>
                       </a:r>
-                      <a:endParaRPr lang="en-US" sz="1200" dirty="0">
+                      <a:endParaRPr lang="en-US" sz="1400" dirty="0">
                         <a:latin typeface="Arial" panose="020B0604020202020204" pitchFamily="34" charset="0"/>
                         <a:cs typeface="Arial" panose="020B0604020202020204" pitchFamily="34" charset="0"/>
                       </a:endParaRPr>
@@ -5343,13 +5273,13 @@
                     <a:lstStyle/>
                     <a:p>
                       <a:r>
-                        <a:rPr lang="en-US" sz="1200" dirty="0" smtClean="0">
+                        <a:rPr lang="en-US" sz="1400" dirty="0" smtClean="0">
                           <a:latin typeface="Arial" panose="020B0604020202020204" pitchFamily="34" charset="0"/>
                           <a:cs typeface="Arial" panose="020B0604020202020204" pitchFamily="34" charset="0"/>
                         </a:rPr>
                         <a:t>1.9s</a:t>
                       </a:r>
-                      <a:endParaRPr lang="en-US" sz="1200" dirty="0">
+                      <a:endParaRPr lang="en-US" sz="1400" dirty="0">
                         <a:latin typeface="Arial" panose="020B0604020202020204" pitchFamily="34" charset="0"/>
                         <a:cs typeface="Arial" panose="020B0604020202020204" pitchFamily="34" charset="0"/>
                       </a:endParaRPr>
@@ -5382,14 +5312,14 @@
                         <a:defRPr/>
                       </a:pPr>
                       <a:r>
-                        <a:rPr lang="en-US" sz="1200" dirty="0" smtClean="0">
+                        <a:rPr lang="en-US" sz="1400" dirty="0" smtClean="0">
                           <a:latin typeface="Arial" panose="020B0604020202020204" pitchFamily="34" charset="0"/>
                           <a:cs typeface="Arial" panose="020B0604020202020204" pitchFamily="34" charset="0"/>
                         </a:rPr>
                         <a:t>10</a:t>
                       </a:r>
                       <a:r>
-                        <a:rPr lang="en-US" sz="1200" baseline="30000" dirty="0" smtClean="0">
+                        <a:rPr lang="en-US" sz="1400" baseline="30000" dirty="0" smtClean="0">
                           <a:latin typeface="Arial" panose="020B0604020202020204" pitchFamily="34" charset="0"/>
                           <a:cs typeface="Arial" panose="020B0604020202020204" pitchFamily="34" charset="0"/>
                         </a:rPr>
@@ -5416,13 +5346,13 @@
                     <a:p>
                       <a:pPr algn="r"/>
                       <a:r>
-                        <a:rPr lang="en-US" sz="1200" dirty="0" smtClean="0">
+                        <a:rPr lang="en-US" sz="1400" dirty="0" smtClean="0">
                           <a:latin typeface="Arial" panose="020B0604020202020204" pitchFamily="34" charset="0"/>
                           <a:cs typeface="Arial" panose="020B0604020202020204" pitchFamily="34" charset="0"/>
                         </a:rPr>
                         <a:t>20.7%</a:t>
                       </a:r>
-                      <a:endParaRPr lang="en-US" sz="1200" dirty="0">
+                      <a:endParaRPr lang="en-US" sz="1400" dirty="0">
                         <a:latin typeface="Arial" panose="020B0604020202020204" pitchFamily="34" charset="0"/>
                         <a:cs typeface="Arial" panose="020B0604020202020204" pitchFamily="34" charset="0"/>
                       </a:endParaRPr>
@@ -5447,13 +5377,13 @@
                     <a:p>
                       <a:pPr algn="r"/>
                       <a:r>
-                        <a:rPr lang="en-US" sz="1200" dirty="0" smtClean="0">
+                        <a:rPr lang="en-US" sz="1400" dirty="0" smtClean="0">
                           <a:latin typeface="Arial" panose="020B0604020202020204" pitchFamily="34" charset="0"/>
                           <a:cs typeface="Arial" panose="020B0604020202020204" pitchFamily="34" charset="0"/>
                         </a:rPr>
                         <a:t>22.8%</a:t>
                       </a:r>
-                      <a:endParaRPr lang="en-US" sz="1200" dirty="0">
+                      <a:endParaRPr lang="en-US" sz="1400" dirty="0">
                         <a:latin typeface="Arial" panose="020B0604020202020204" pitchFamily="34" charset="0"/>
                         <a:cs typeface="Arial" panose="020B0604020202020204" pitchFamily="34" charset="0"/>
                       </a:endParaRPr>
@@ -5467,13 +5397,13 @@
                     <a:lstStyle/>
                     <a:p>
                       <a:r>
-                        <a:rPr lang="en-US" sz="1200" dirty="0" smtClean="0">
+                        <a:rPr lang="en-US" sz="1400" dirty="0" smtClean="0">
                           <a:latin typeface="Arial" panose="020B0604020202020204" pitchFamily="34" charset="0"/>
                           <a:cs typeface="Arial" panose="020B0604020202020204" pitchFamily="34" charset="0"/>
                         </a:rPr>
                         <a:t>0.003</a:t>
                       </a:r>
-                      <a:endParaRPr lang="en-US" sz="1200" baseline="30000" dirty="0">
+                      <a:endParaRPr lang="en-US" sz="1400" baseline="30000" dirty="0">
                         <a:latin typeface="Arial" panose="020B0604020202020204" pitchFamily="34" charset="0"/>
                         <a:cs typeface="Arial" panose="020B0604020202020204" pitchFamily="34" charset="0"/>
                       </a:endParaRPr>
@@ -5497,13 +5427,13 @@
                     <a:lstStyle/>
                     <a:p>
                       <a:r>
-                        <a:rPr lang="en-US" sz="1200" dirty="0" smtClean="0">
+                        <a:rPr lang="en-US" sz="1400" dirty="0" smtClean="0">
                           <a:latin typeface="Arial" panose="020B0604020202020204" pitchFamily="34" charset="0"/>
                           <a:cs typeface="Arial" panose="020B0604020202020204" pitchFamily="34" charset="0"/>
                         </a:rPr>
                         <a:t>10s</a:t>
                       </a:r>
-                      <a:endParaRPr lang="en-US" sz="1200" dirty="0">
+                      <a:endParaRPr lang="en-US" sz="1400" dirty="0">
                         <a:latin typeface="Arial" panose="020B0604020202020204" pitchFamily="34" charset="0"/>
                         <a:cs typeface="Arial" panose="020B0604020202020204" pitchFamily="34" charset="0"/>
                       </a:endParaRPr>
@@ -5527,13 +5457,13 @@
                     <a:lstStyle/>
                     <a:p>
                       <a:r>
-                        <a:rPr lang="en-US" sz="1200" dirty="0" smtClean="0">
+                        <a:rPr lang="en-US" sz="1400" dirty="0" smtClean="0">
                           <a:latin typeface="Arial" panose="020B0604020202020204" pitchFamily="34" charset="0"/>
                           <a:cs typeface="Arial" panose="020B0604020202020204" pitchFamily="34" charset="0"/>
                         </a:rPr>
                         <a:t>13s</a:t>
                       </a:r>
-                      <a:endParaRPr lang="en-US" sz="1200" dirty="0">
+                      <a:endParaRPr lang="en-US" sz="1400" dirty="0">
                         <a:latin typeface="Arial" panose="020B0604020202020204" pitchFamily="34" charset="0"/>
                         <a:cs typeface="Arial" panose="020B0604020202020204" pitchFamily="34" charset="0"/>
                       </a:endParaRPr>
@@ -5566,14 +5496,14 @@
                         <a:defRPr/>
                       </a:pPr>
                       <a:r>
-                        <a:rPr lang="en-US" sz="1200" dirty="0" smtClean="0">
+                        <a:rPr lang="en-US" sz="1400" dirty="0" smtClean="0">
                           <a:latin typeface="Arial" panose="020B0604020202020204" pitchFamily="34" charset="0"/>
                           <a:cs typeface="Arial" panose="020B0604020202020204" pitchFamily="34" charset="0"/>
                         </a:rPr>
                         <a:t>10</a:t>
                       </a:r>
                       <a:r>
-                        <a:rPr lang="en-US" sz="1200" baseline="30000" dirty="0" smtClean="0">
+                        <a:rPr lang="en-US" sz="1400" baseline="30000" dirty="0" smtClean="0">
                           <a:latin typeface="Arial" panose="020B0604020202020204" pitchFamily="34" charset="0"/>
                           <a:cs typeface="Arial" panose="020B0604020202020204" pitchFamily="34" charset="0"/>
                         </a:rPr>
@@ -5600,13 +5530,13 @@
                     <a:p>
                       <a:pPr algn="r"/>
                       <a:r>
-                        <a:rPr lang="en-US" sz="1200" dirty="0" smtClean="0">
+                        <a:rPr lang="en-US" sz="1400" dirty="0" smtClean="0">
                           <a:latin typeface="Arial" panose="020B0604020202020204" pitchFamily="34" charset="0"/>
                           <a:cs typeface="Arial" panose="020B0604020202020204" pitchFamily="34" charset="0"/>
                         </a:rPr>
                         <a:t>13.9%</a:t>
                       </a:r>
-                      <a:endParaRPr lang="en-US" sz="1200" dirty="0">
+                      <a:endParaRPr lang="en-US" sz="1400" dirty="0">
                         <a:latin typeface="Arial" panose="020B0604020202020204" pitchFamily="34" charset="0"/>
                         <a:cs typeface="Arial" panose="020B0604020202020204" pitchFamily="34" charset="0"/>
                       </a:endParaRPr>
@@ -5631,13 +5561,13 @@
                     <a:p>
                       <a:pPr algn="r"/>
                       <a:r>
-                        <a:rPr lang="en-US" sz="1200" dirty="0" smtClean="0">
+                        <a:rPr lang="en-US" sz="1400" dirty="0" smtClean="0">
                           <a:latin typeface="Arial" panose="020B0604020202020204" pitchFamily="34" charset="0"/>
                           <a:cs typeface="Arial" panose="020B0604020202020204" pitchFamily="34" charset="0"/>
                         </a:rPr>
                         <a:t>14.2%</a:t>
                       </a:r>
-                      <a:endParaRPr lang="en-US" sz="1200" dirty="0">
+                      <a:endParaRPr lang="en-US" sz="1400" dirty="0">
                         <a:latin typeface="Arial" panose="020B0604020202020204" pitchFamily="34" charset="0"/>
                         <a:cs typeface="Arial" panose="020B0604020202020204" pitchFamily="34" charset="0"/>
                       </a:endParaRPr>
@@ -5651,13 +5581,13 @@
                     <a:lstStyle/>
                     <a:p>
                       <a:r>
-                        <a:rPr lang="en-US" sz="1200" dirty="0" smtClean="0">
+                        <a:rPr lang="en-US" sz="1400" dirty="0" smtClean="0">
                           <a:latin typeface="Arial" panose="020B0604020202020204" pitchFamily="34" charset="0"/>
                           <a:cs typeface="Arial" panose="020B0604020202020204" pitchFamily="34" charset="0"/>
                         </a:rPr>
                         <a:t>0.043</a:t>
                       </a:r>
-                      <a:endParaRPr lang="en-US" sz="1200" dirty="0">
+                      <a:endParaRPr lang="en-US" sz="1400" dirty="0">
                         <a:latin typeface="Arial" panose="020B0604020202020204" pitchFamily="34" charset="0"/>
                         <a:cs typeface="Arial" panose="020B0604020202020204" pitchFamily="34" charset="0"/>
                       </a:endParaRPr>
@@ -5681,13 +5611,13 @@
                     <a:lstStyle/>
                     <a:p>
                       <a:r>
-                        <a:rPr lang="en-US" sz="1200" dirty="0" smtClean="0">
+                        <a:rPr lang="en-US" sz="1400" dirty="0" smtClean="0">
                           <a:latin typeface="Arial" panose="020B0604020202020204" pitchFamily="34" charset="0"/>
                           <a:cs typeface="Arial" panose="020B0604020202020204" pitchFamily="34" charset="0"/>
                         </a:rPr>
                         <a:t>96s</a:t>
                       </a:r>
-                      <a:endParaRPr lang="en-US" sz="1200" dirty="0">
+                      <a:endParaRPr lang="en-US" sz="1400" dirty="0">
                         <a:latin typeface="Arial" panose="020B0604020202020204" pitchFamily="34" charset="0"/>
                         <a:cs typeface="Arial" panose="020B0604020202020204" pitchFamily="34" charset="0"/>
                       </a:endParaRPr>
@@ -5711,13 +5641,13 @@
                     <a:lstStyle/>
                     <a:p>
                       <a:r>
-                        <a:rPr lang="en-US" sz="1200" dirty="0" smtClean="0">
+                        <a:rPr lang="en-US" sz="1400" dirty="0" smtClean="0">
                           <a:latin typeface="Arial" panose="020B0604020202020204" pitchFamily="34" charset="0"/>
                           <a:cs typeface="Arial" panose="020B0604020202020204" pitchFamily="34" charset="0"/>
                         </a:rPr>
                         <a:t>118s</a:t>
                       </a:r>
-                      <a:endParaRPr lang="en-US" sz="1200" dirty="0">
+                      <a:endParaRPr lang="en-US" sz="1400" dirty="0">
                         <a:latin typeface="Arial" panose="020B0604020202020204" pitchFamily="34" charset="0"/>
                         <a:cs typeface="Arial" panose="020B0604020202020204" pitchFamily="34" charset="0"/>
                       </a:endParaRPr>
@@ -5742,105 +5672,101 @@
         </p:nvSpPr>
         <p:spPr>
           <a:xfrm>
-            <a:off x="4338323" y="1523248"/>
-            <a:ext cx="3769360" cy="3887651"/>
+            <a:off x="257209" y="3248197"/>
+            <a:ext cx="7850471" cy="2355739"/>
           </a:xfrm>
         </p:spPr>
         <p:txBody>
           <a:bodyPr/>
           <a:lstStyle/>
           <a:p>
+            <a:r>
+              <a:rPr lang="en-US" sz="1800" dirty="0">
+                <a:latin typeface="Arial" panose="020B0604020202020204" pitchFamily="34" charset="0"/>
+                <a:cs typeface="Arial" panose="020B0604020202020204" pitchFamily="34" charset="0"/>
+              </a:rPr>
+              <a:t>The </a:t>
+            </a:r>
+            <a:r>
+              <a:rPr lang="en-US" sz="1800" dirty="0" err="1">
+                <a:latin typeface="Arial" panose="020B0604020202020204" pitchFamily="34" charset="0"/>
+                <a:cs typeface="Arial" panose="020B0604020202020204" pitchFamily="34" charset="0"/>
+              </a:rPr>
+              <a:t>pGA</a:t>
+            </a:r>
+            <a:r>
+              <a:rPr lang="en-US" sz="1800" dirty="0">
+                <a:latin typeface="Arial" panose="020B0604020202020204" pitchFamily="34" charset="0"/>
+                <a:cs typeface="Arial" panose="020B0604020202020204" pitchFamily="34" charset="0"/>
+              </a:rPr>
+              <a:t> with adaptive parameters leads to better quality solutions than static parameters for any fixed length run in #generations.</a:t>
+            </a:r>
+          </a:p>
+          <a:p>
+            <a:r>
+              <a:rPr lang="en-US" sz="1800" dirty="0">
+                <a:latin typeface="Arial" panose="020B0604020202020204" pitchFamily="34" charset="0"/>
+                <a:cs typeface="Arial" panose="020B0604020202020204" pitchFamily="34" charset="0"/>
+              </a:rPr>
+              <a:t>The statistical significance of differences decreases with run length</a:t>
+            </a:r>
+          </a:p>
+          <a:p>
+            <a:pPr lvl="1"/>
             <a:r>
               <a:rPr lang="en-US" sz="1600" dirty="0">
                 <a:latin typeface="Arial" panose="020B0604020202020204" pitchFamily="34" charset="0"/>
                 <a:cs typeface="Arial" panose="020B0604020202020204" pitchFamily="34" charset="0"/>
               </a:rPr>
-              <a:t>The </a:t>
+              <a:t>The longer the run, the nearer to the </a:t>
             </a:r>
             <a:r>
               <a:rPr lang="en-US" sz="1600" dirty="0" err="1">
                 <a:latin typeface="Arial" panose="020B0604020202020204" pitchFamily="34" charset="0"/>
                 <a:cs typeface="Arial" panose="020B0604020202020204" pitchFamily="34" charset="0"/>
               </a:rPr>
-              <a:t>pGA</a:t>
+              <a:t>optimals</a:t>
             </a:r>
             <a:r>
               <a:rPr lang="en-US" sz="1600" dirty="0">
                 <a:latin typeface="Arial" panose="020B0604020202020204" pitchFamily="34" charset="0"/>
                 <a:cs typeface="Arial" panose="020B0604020202020204" pitchFamily="34" charset="0"/>
               </a:rPr>
-              <a:t> with adaptive parameters leads to better quality solutions than static parameters for any fixed length run in #generations.</a:t>
-            </a:r>
-          </a:p>
-          <a:p>
+              <a:t> both versions become</a:t>
+            </a:r>
+          </a:p>
+          <a:p>
+            <a:r>
+              <a:rPr lang="en-US" sz="1800" dirty="0">
+                <a:latin typeface="Arial" panose="020B0604020202020204" pitchFamily="34" charset="0"/>
+                <a:cs typeface="Arial" panose="020B0604020202020204" pitchFamily="34" charset="0"/>
+              </a:rPr>
+              <a:t>The </a:t>
+            </a:r>
+            <a:r>
+              <a:rPr lang="en-US" sz="1800" dirty="0" err="1">
+                <a:latin typeface="Arial" panose="020B0604020202020204" pitchFamily="34" charset="0"/>
+                <a:cs typeface="Arial" panose="020B0604020202020204" pitchFamily="34" charset="0"/>
+              </a:rPr>
+              <a:t>pGA</a:t>
+            </a:r>
+            <a:r>
+              <a:rPr lang="en-US" sz="1800" dirty="0">
+                <a:latin typeface="Arial" panose="020B0604020202020204" pitchFamily="34" charset="0"/>
+                <a:cs typeface="Arial" panose="020B0604020202020204" pitchFamily="34" charset="0"/>
+              </a:rPr>
+              <a:t> with adaptive parameters requires less time than with static parameters for the same number of generations</a:t>
+            </a:r>
+          </a:p>
+          <a:p>
+            <a:pPr lvl="1"/>
             <a:r>
               <a:rPr lang="en-US" sz="1600" dirty="0">
                 <a:latin typeface="Arial" panose="020B0604020202020204" pitchFamily="34" charset="0"/>
                 <a:cs typeface="Arial" panose="020B0604020202020204" pitchFamily="34" charset="0"/>
               </a:rPr>
-              <a:t>The statistical significance of differences decreases with run length</a:t>
-            </a:r>
-          </a:p>
-          <a:p>
-            <a:pPr lvl="1"/>
-            <a:r>
-              <a:rPr lang="en-US" sz="1400" dirty="0">
-                <a:latin typeface="Arial" panose="020B0604020202020204" pitchFamily="34" charset="0"/>
-                <a:cs typeface="Arial" panose="020B0604020202020204" pitchFamily="34" charset="0"/>
-              </a:rPr>
-              <a:t>The longer the run, the nearer to the </a:t>
-            </a:r>
-            <a:r>
-              <a:rPr lang="en-US" sz="1400" dirty="0" err="1">
-                <a:latin typeface="Arial" panose="020B0604020202020204" pitchFamily="34" charset="0"/>
-                <a:cs typeface="Arial" panose="020B0604020202020204" pitchFamily="34" charset="0"/>
-              </a:rPr>
-              <a:t>optimals</a:t>
-            </a:r>
-            <a:r>
-              <a:rPr lang="en-US" sz="1400" dirty="0">
-                <a:latin typeface="Arial" panose="020B0604020202020204" pitchFamily="34" charset="0"/>
-                <a:cs typeface="Arial" panose="020B0604020202020204" pitchFamily="34" charset="0"/>
-              </a:rPr>
-              <a:t> both versions become</a:t>
-            </a:r>
-          </a:p>
-          <a:p>
-            <a:r>
-              <a:rPr lang="en-US" sz="1600" dirty="0">
-                <a:latin typeface="Arial" panose="020B0604020202020204" pitchFamily="34" charset="0"/>
-                <a:cs typeface="Arial" panose="020B0604020202020204" pitchFamily="34" charset="0"/>
-              </a:rPr>
-              <a:t>The </a:t>
-            </a:r>
-            <a:r>
-              <a:rPr lang="en-US" sz="1600" dirty="0" err="1">
-                <a:latin typeface="Arial" panose="020B0604020202020204" pitchFamily="34" charset="0"/>
-                <a:cs typeface="Arial" panose="020B0604020202020204" pitchFamily="34" charset="0"/>
-              </a:rPr>
-              <a:t>pGA</a:t>
-            </a:r>
-            <a:r>
-              <a:rPr lang="en-US" sz="1600" dirty="0">
-                <a:latin typeface="Arial" panose="020B0604020202020204" pitchFamily="34" charset="0"/>
-                <a:cs typeface="Arial" panose="020B0604020202020204" pitchFamily="34" charset="0"/>
-              </a:rPr>
-              <a:t> with adaptive parameters requires less time than with static parameters for the same number of generations</a:t>
-            </a:r>
-          </a:p>
-          <a:p>
-            <a:pPr lvl="1"/>
-            <a:r>
-              <a:rPr lang="en-US" sz="1400" dirty="0">
-                <a:latin typeface="Arial" panose="020B0604020202020204" pitchFamily="34" charset="0"/>
-                <a:cs typeface="Arial" panose="020B0604020202020204" pitchFamily="34" charset="0"/>
-              </a:rPr>
               <a:t>Crossover rate tends to decline later in the run with adaptive parameters</a:t>
             </a:r>
-            <a:endParaRPr lang="en-US" sz="1400" dirty="0">
-              <a:latin typeface="Arial" panose="020B0604020202020204" pitchFamily="34" charset="0"/>
-              <a:cs typeface="Arial" panose="020B0604020202020204" pitchFamily="34" charset="0"/>
-            </a:endParaRPr>
           </a:p>
         </p:txBody>
       </p:sp>
@@ -5852,8 +5778,8 @@
         </p:nvSpPr>
         <p:spPr>
           <a:xfrm>
-            <a:off x="426245" y="3738491"/>
-            <a:ext cx="3607078" cy="523220"/>
+            <a:off x="5056969" y="1662193"/>
+            <a:ext cx="2920962" cy="830997"/>
           </a:xfrm>
           <a:prstGeom prst="rect">
             <a:avLst/>
@@ -5861,20 +5787,20 @@
           <a:noFill/>
         </p:spPr>
         <p:txBody>
-          <a:bodyPr wrap="none" rtlCol="0">
+          <a:bodyPr wrap="square" rtlCol="0">
             <a:spAutoFit/>
           </a:bodyPr>
           <a:lstStyle/>
           <a:p>
             <a:r>
-              <a:rPr lang="en-US" sz="1400" b="1" dirty="0">
+              <a:rPr lang="en-US" sz="1600" b="1" dirty="0">
                 <a:latin typeface="Arial" panose="020B0604020202020204" pitchFamily="34" charset="0"/>
                 <a:cs typeface="Arial" panose="020B0604020202020204" pitchFamily="34" charset="0"/>
               </a:rPr>
               <a:t>G</a:t>
             </a:r>
             <a:r>
-              <a:rPr lang="en-US" sz="1400" dirty="0">
+              <a:rPr lang="en-US" sz="1600" dirty="0">
                 <a:latin typeface="Arial" panose="020B0604020202020204" pitchFamily="34" charset="0"/>
                 <a:cs typeface="Arial" panose="020B0604020202020204" pitchFamily="34" charset="0"/>
               </a:rPr>
@@ -5883,14 +5809,14 @@
           </a:p>
           <a:p>
             <a:r>
-              <a:rPr lang="en-US" sz="1400" b="1" dirty="0">
+              <a:rPr lang="en-US" sz="1600" b="1" dirty="0">
                 <a:latin typeface="Arial" panose="020B0604020202020204" pitchFamily="34" charset="0"/>
                 <a:cs typeface="Arial" panose="020B0604020202020204" pitchFamily="34" charset="0"/>
               </a:rPr>
               <a:t>p</a:t>
             </a:r>
             <a:r>
-              <a:rPr lang="en-US" sz="1400" dirty="0">
+              <a:rPr lang="en-US" sz="1600" dirty="0">
                 <a:latin typeface="Arial" panose="020B0604020202020204" pitchFamily="34" charset="0"/>
                 <a:cs typeface="Arial" panose="020B0604020202020204" pitchFamily="34" charset="0"/>
               </a:rPr>
@@ -5907,8 +5833,8 @@
         </p:nvSpPr>
         <p:spPr>
           <a:xfrm>
-            <a:off x="811635" y="1507781"/>
-            <a:ext cx="1928477" cy="523220"/>
+            <a:off x="887136" y="981285"/>
+            <a:ext cx="2183996" cy="584775"/>
           </a:xfrm>
           <a:prstGeom prst="rect">
             <a:avLst/>
@@ -5922,7 +5848,7 @@
           <a:lstStyle/>
           <a:p>
             <a:r>
-              <a:rPr lang="en-US" sz="1400" b="1" dirty="0">
+              <a:rPr lang="en-US" sz="1600" b="1" dirty="0">
                 <a:latin typeface="Arial" panose="020B0604020202020204" pitchFamily="34" charset="0"/>
                 <a:cs typeface="Arial" panose="020B0604020202020204" pitchFamily="34" charset="0"/>
               </a:rPr>
@@ -5931,20 +5857,20 @@
           </a:p>
           <a:p>
             <a:r>
-              <a:rPr lang="en-US" sz="1400" b="1" dirty="0">
+              <a:rPr lang="en-US" sz="1600" b="1" dirty="0">
                 <a:latin typeface="Arial" panose="020B0604020202020204" pitchFamily="34" charset="0"/>
                 <a:cs typeface="Arial" panose="020B0604020202020204" pitchFamily="34" charset="0"/>
               </a:rPr>
               <a:t>From </a:t>
             </a:r>
             <a:r>
-              <a:rPr lang="en-US" sz="1400" b="1" dirty="0" err="1">
+              <a:rPr lang="en-US" sz="1600" b="1" dirty="0" err="1">
                 <a:latin typeface="Arial" panose="020B0604020202020204" pitchFamily="34" charset="0"/>
                 <a:cs typeface="Arial" panose="020B0604020202020204" pitchFamily="34" charset="0"/>
               </a:rPr>
               <a:t>optimals</a:t>
             </a:r>
-            <a:endParaRPr lang="en-US" sz="1400" b="1" dirty="0">
+            <a:endParaRPr lang="en-US" sz="1600" b="1" dirty="0">
               <a:latin typeface="Arial" panose="020B0604020202020204" pitchFamily="34" charset="0"/>
               <a:cs typeface="Arial" panose="020B0604020202020204" pitchFamily="34" charset="0"/>
             </a:endParaRPr>
@@ -5959,8 +5885,8 @@
         </p:nvSpPr>
         <p:spPr>
           <a:xfrm>
-            <a:off x="2963488" y="1523251"/>
-            <a:ext cx="1117614" cy="523220"/>
+            <a:off x="3159402" y="940902"/>
+            <a:ext cx="1255472" cy="584775"/>
           </a:xfrm>
           <a:prstGeom prst="rect">
             <a:avLst/>
@@ -5974,7 +5900,7 @@
           <a:lstStyle/>
           <a:p>
             <a:r>
-              <a:rPr lang="en-US" sz="1400" b="1" dirty="0">
+              <a:rPr lang="en-US" sz="1600" b="1" dirty="0">
                 <a:latin typeface="Arial" panose="020B0604020202020204" pitchFamily="34" charset="0"/>
                 <a:cs typeface="Arial" panose="020B0604020202020204" pitchFamily="34" charset="0"/>
               </a:rPr>
@@ -5983,16 +5909,12 @@
           </a:p>
           <a:p>
             <a:r>
-              <a:rPr lang="en-US" sz="1400" b="1" dirty="0">
+              <a:rPr lang="en-US" sz="1600" b="1" dirty="0">
                 <a:latin typeface="Arial" panose="020B0604020202020204" pitchFamily="34" charset="0"/>
                 <a:cs typeface="Arial" panose="020B0604020202020204" pitchFamily="34" charset="0"/>
               </a:rPr>
               <a:t>in seconds</a:t>
             </a:r>
-            <a:endParaRPr lang="en-US" sz="1400" b="1" dirty="0">
-              <a:latin typeface="Arial" panose="020B0604020202020204" pitchFamily="34" charset="0"/>
-              <a:cs typeface="Arial" panose="020B0604020202020204" pitchFamily="34" charset="0"/>
-            </a:endParaRPr>
           </a:p>
         </p:txBody>
       </p:sp>
@@ -6061,8 +5983,8 @@
         </p:nvSpPr>
         <p:spPr>
           <a:xfrm>
-            <a:off x="323719" y="948447"/>
-            <a:ext cx="7901678" cy="4294671"/>
+            <a:off x="251670" y="948447"/>
+            <a:ext cx="8024061" cy="4294671"/>
           </a:xfrm>
         </p:spPr>
         <p:txBody>
@@ -6165,7 +6087,6 @@
               <a:rPr lang="en-US" sz="1600" dirty="0"/>
               <a:t>Similar results may be found for other metaheuristics that rely on randomness</a:t>
             </a:r>
-            <a:endParaRPr lang="en-US" sz="1600" dirty="0"/>
           </a:p>
         </p:txBody>
       </p:sp>
@@ -6370,11 +6291,7 @@
             <a:pPr lvl="1"/>
             <a:r>
               <a:rPr lang="en-US" sz="1600" dirty="0"/>
-              <a:t>Genetic </a:t>
-            </a:r>
-            <a:r>
-              <a:rPr lang="en-US" sz="1600" dirty="0"/>
-              <a:t>algorithm operators involve significant random behavior.</a:t>
+              <a:t>Genetic algorithm operators involve significant random behavior.</a:t>
             </a:r>
           </a:p>
           <a:p>
@@ -6445,11 +6362,7 @@
           <a:p>
             <a:r>
               <a:rPr lang="en-US" sz="3600" dirty="0" smtClean="0"/>
-              <a:t>Usage of Random Numbers in </a:t>
-            </a:r>
-            <a:r>
-              <a:rPr lang="en-US" sz="3600" dirty="0" smtClean="0"/>
-              <a:t>GAs</a:t>
+              <a:t>Usage of Random Numbers in GAs</a:t>
             </a:r>
             <a:endParaRPr lang="en-US" sz="3600" dirty="0"/>
           </a:p>
@@ -6540,7 +6453,6 @@
               <a:rPr lang="en-US" sz="1600" dirty="0"/>
               <a:t>).</a:t>
             </a:r>
-            <a:endParaRPr lang="en-US" sz="1600" dirty="0"/>
           </a:p>
         </p:txBody>
       </p:sp>
@@ -6632,19 +6544,7 @@
             <a:pPr lvl="1"/>
             <a:r>
               <a:rPr lang="en-US" sz="1600" dirty="0"/>
-              <a:t>C++11: </a:t>
-            </a:r>
-            <a:r>
-              <a:rPr lang="en-US" sz="1600" dirty="0"/>
-              <a:t>linear </a:t>
-            </a:r>
-            <a:r>
-              <a:rPr lang="en-US" sz="1600" dirty="0"/>
-              <a:t>congruential </a:t>
-            </a:r>
-            <a:r>
-              <a:rPr lang="en-US" sz="1600" dirty="0"/>
-              <a:t>as well as </a:t>
+              <a:t>C++11: linear congruential as well as </a:t>
             </a:r>
             <a:r>
               <a:rPr lang="en-US" sz="1600" dirty="0" err="1"/>
@@ -6652,26 +6552,14 @@
             </a:r>
             <a:r>
               <a:rPr lang="en-US" sz="1600" dirty="0"/>
-              <a:t> </a:t>
-            </a:r>
+              <a:t> Twister</a:t>
+            </a:r>
+          </a:p>
+          <a:p>
+            <a:pPr lvl="1"/>
             <a:r>
               <a:rPr lang="en-US" sz="1600" dirty="0"/>
-              <a:t>Twister</a:t>
-            </a:r>
-          </a:p>
-          <a:p>
-            <a:pPr lvl="1"/>
-            <a:r>
-              <a:rPr lang="en-US" sz="1600" dirty="0"/>
-              <a:t>Java: </a:t>
-            </a:r>
-            <a:r>
-              <a:rPr lang="en-US" sz="1600" dirty="0"/>
-              <a:t>linear </a:t>
-            </a:r>
-            <a:r>
-              <a:rPr lang="en-US" sz="1600" dirty="0"/>
-              <a:t>congruential (Random class), </a:t>
+              <a:t>Java: linear congruential (Random class), </a:t>
             </a:r>
             <a:r>
               <a:rPr lang="en-US" sz="1600" dirty="0" err="1"/>
@@ -6702,15 +6590,7 @@
             <a:pPr lvl="1"/>
             <a:r>
               <a:rPr lang="en-US" sz="1600" dirty="0"/>
-              <a:t>Python: </a:t>
-            </a:r>
-            <a:r>
-              <a:rPr lang="en-US" sz="1600" dirty="0"/>
-              <a:t>Wichmann-Hill (prior </a:t>
-            </a:r>
-            <a:r>
-              <a:rPr lang="en-US" sz="1600" dirty="0"/>
-              <a:t>to version 2.3), </a:t>
+              <a:t>Python: Wichmann-Hill (prior to version 2.3), </a:t>
             </a:r>
             <a:r>
               <a:rPr lang="en-US" sz="1600" dirty="0" err="1"/>
@@ -6718,11 +6598,7 @@
             </a:r>
             <a:r>
               <a:rPr lang="en-US" sz="1600" dirty="0"/>
-              <a:t> </a:t>
-            </a:r>
-            <a:r>
-              <a:rPr lang="en-US" sz="1600" dirty="0"/>
-              <a:t>Twister (version 2.3 onward)</a:t>
+              <a:t> Twister (version 2.3 onward)</a:t>
             </a:r>
           </a:p>
           <a:p>
@@ -6772,11 +6648,7 @@
             </a:r>
             <a:r>
               <a:rPr lang="en-US" sz="1600" dirty="0"/>
-              <a:t>: much faster, </a:t>
-            </a:r>
-            <a:r>
-              <a:rPr lang="en-US" sz="1600" dirty="0"/>
-              <a:t>and good quality (passes </a:t>
+              <a:t>: much faster, and good quality (passes </a:t>
             </a:r>
             <a:r>
               <a:rPr lang="en-US" sz="1600" dirty="0" err="1"/>
@@ -6784,11 +6656,7 @@
             </a:r>
             <a:r>
               <a:rPr lang="en-US" sz="1600" dirty="0"/>
-              <a:t> tests</a:t>
-            </a:r>
-            <a:r>
-              <a:rPr lang="en-US" sz="1600" dirty="0"/>
-              <a:t>)</a:t>
+              <a:t> tests)</a:t>
             </a:r>
           </a:p>
           <a:p>
@@ -6886,22 +6754,14 @@
             <a:pPr lvl="1"/>
             <a:r>
               <a:rPr lang="en-US" sz="1600" dirty="0"/>
-              <a:t>C, C#, and pre-2011 C</a:t>
-            </a:r>
+              <a:t>C, C#, and pre-2011 C++: None in standard libraries.</a:t>
+            </a:r>
+          </a:p>
+          <a:p>
+            <a:pPr lvl="1"/>
             <a:r>
               <a:rPr lang="en-US" sz="1600" dirty="0"/>
-              <a:t>++: None in standard libraries.</a:t>
-            </a:r>
-          </a:p>
-          <a:p>
-            <a:pPr lvl="1"/>
-            <a:r>
-              <a:rPr lang="en-US" sz="1600" dirty="0"/>
-              <a:t>C++</a:t>
-            </a:r>
-            <a:r>
-              <a:rPr lang="en-US" sz="1600" dirty="0"/>
-              <a:t>11: polar method</a:t>
+              <a:t>C++11: polar method</a:t>
             </a:r>
           </a:p>
           <a:p>
@@ -7173,7 +7033,6 @@
               <a:rPr lang="en-US" sz="1600" dirty="0"/>
               <a:t>[Cicirello, GECCO ‘06]</a:t>
             </a:r>
-            <a:endParaRPr lang="en-US" sz="1600" dirty="0"/>
           </a:p>
         </p:txBody>
       </p:sp>
@@ -7278,8 +7137,8 @@
           </a:p>
         </p:txBody>
       </p:sp>
-      <mc:AlternateContent xmlns:mc="http://schemas.openxmlformats.org/markup-compatibility/2006">
-        <mc:Choice xmlns:a14="http://schemas.microsoft.com/office/drawing/2010/main" Requires="a14">
+      <mc:AlternateContent xmlns:mc="http://schemas.openxmlformats.org/markup-compatibility/2006" xmlns:a14="http://schemas.microsoft.com/office/drawing/2010/main">
+        <mc:Choice Requires="a14">
           <p:sp>
             <p:nvSpPr>
               <p:cNvPr id="3" name="Content Placeholder 2"/>
@@ -7332,11 +7191,7 @@
                 <a:pPr lvl="1"/>
                 <a:r>
                   <a:rPr lang="en-US" sz="1600" dirty="0"/>
-                  <a:t>Each population member is a permutation with control parameters </a:t>
-                </a:r>
-                <a:r>
-                  <a:rPr lang="en-US" sz="1600" dirty="0"/>
-                  <a:t>appended</a:t>
+                  <a:t>Each population member is a permutation with control parameters appended</a:t>
                 </a:r>
               </a:p>
               <a:p>
@@ -7535,11 +7390,7 @@
                 </a:r>
                 <a:r>
                   <a:rPr lang="en-US" sz="1600" dirty="0"/>
-                  <a:t>]: Crossover </a:t>
-                </a:r>
-                <a:r>
-                  <a:rPr lang="en-US" sz="1600" dirty="0"/>
-                  <a:t>rate: If </a:t>
+                  <a:t>]: Crossover rate: If </a:t>
                 </a:r>
                 <a:r>
                   <a:rPr lang="en-US" sz="1600" i="1" dirty="0"/>
@@ -7555,15 +7406,7 @@
                 </a:r>
                 <a:r>
                   <a:rPr lang="en-US" sz="1600" dirty="0"/>
-                  <a:t>are </a:t>
-                </a:r>
-                <a:r>
-                  <a:rPr lang="en-US" sz="1600" dirty="0"/>
-                  <a:t>paired, </a:t>
-                </a:r>
-                <a:r>
-                  <a:rPr lang="en-US" sz="1600" dirty="0"/>
-                  <a:t>then crossover occurs with either probability C[</a:t>
+                  <a:t>are paired, then crossover occurs with either probability C[</a:t>
                 </a:r>
                 <a:r>
                   <a:rPr lang="en-US" sz="1600" dirty="0" err="1"/>
@@ -7587,15 +7430,7 @@
                 </a:r>
                 <a:r>
                   <a:rPr lang="en-US" sz="1600" dirty="0"/>
-                  <a:t>]: Mutation </a:t>
-                </a:r>
-                <a:r>
-                  <a:rPr lang="en-US" sz="1600" dirty="0"/>
-                  <a:t>rate: With </a:t>
-                </a:r>
-                <a:r>
-                  <a:rPr lang="en-US" sz="1600" dirty="0"/>
-                  <a:t>probability M[</a:t>
+                  <a:t>]: Mutation rate: With probability M[</a:t>
                 </a:r>
                 <a:r>
                   <a:rPr lang="en-US" sz="1600" dirty="0" err="1"/>
@@ -7622,7 +7457,7 @@
             </p:txBody>
           </p:sp>
         </mc:Choice>
-        <mc:Fallback>
+        <mc:Fallback xmlns="">
           <p:sp>
             <p:nvSpPr>
               <p:cNvPr id="3" name="Content Placeholder 2"/>
@@ -7708,8 +7543,8 @@
           </a:p>
         </p:txBody>
       </p:sp>
-      <mc:AlternateContent xmlns:mc="http://schemas.openxmlformats.org/markup-compatibility/2006">
-        <mc:Choice xmlns:a14="http://schemas.microsoft.com/office/drawing/2010/main" Requires="a14">
+      <mc:AlternateContent xmlns:mc="http://schemas.openxmlformats.org/markup-compatibility/2006" xmlns:a14="http://schemas.microsoft.com/office/drawing/2010/main">
+        <mc:Choice Requires="a14">
           <p:sp>
             <p:nvSpPr>
               <p:cNvPr id="3" name="Content Placeholder 2"/>
@@ -7819,22 +7654,14 @@
                 </a14:m>
                 <a:r>
                   <a:rPr lang="en-US" sz="1800" dirty="0"/>
-                  <a:t>: Initialized randomly in [0.05, 0.15</a:t>
-                </a:r>
-                <a:r>
-                  <a:rPr lang="en-US" sz="1800" dirty="0"/>
-                  <a:t>)</a:t>
+                  <a:t>: Initialized randomly in [0.05, 0.15)</a:t>
                 </a:r>
               </a:p>
               <a:p>
                 <a:pPr lvl="2"/>
                 <a:r>
                   <a:rPr lang="en-US" sz="1800" dirty="0"/>
-                  <a:t>In each generation, the non-elite members’ parameters adapt via Gaussian Mutation as follows</a:t>
-                </a:r>
-                <a:r>
-                  <a:rPr lang="en-US" sz="1800" dirty="0"/>
-                  <a:t>:</a:t>
+                  <a:t>In each generation, the non-elite members’ parameters adapt via Gaussian Mutation as follows:</a:t>
                 </a:r>
               </a:p>
               <a:p>
@@ -8163,7 +7990,7 @@
             </p:txBody>
           </p:sp>
         </mc:Choice>
-        <mc:Fallback>
+        <mc:Fallback xmlns="">
           <p:sp>
             <p:nvSpPr>
               <p:cNvPr id="3" name="Content Placeholder 2"/>

</xml_diff>